<commit_message>
Add the book details modal in js
</commit_message>
<xml_diff>
--- a/library.pptx
+++ b/library.pptx
@@ -5,7 +5,7 @@
     <p:sldMasterId id="2147483648" r:id="rId1"/>
   </p:sldMasterIdLst>
   <p:sldIdLst>
-    <p:sldId id="256" r:id="rId2"/>
+    <p:sldId id="257" r:id="rId2"/>
   </p:sldIdLst>
   <p:sldSz cx="12192000" cy="6858000"/>
   <p:notesSz cx="6858000" cy="9144000"/>
@@ -104,6 +104,11 @@
       </a:defRPr>
     </a:lvl9pPr>
   </p:defaultTextStyle>
+  <p:extLst>
+    <p:ext uri="{EFAFB233-063F-42B5-8137-9DF3F51BA10A}">
+      <p15:sldGuideLst xmlns:p15="http://schemas.microsoft.com/office/powerpoint/2012/main"/>
+    </p:ext>
+  </p:extLst>
 </p:presentation>
 </file>
 
@@ -254,7 +259,7 @@
           <a:p>
             <a:fld id="{1D016DAE-6BDB-074E-B429-4978463B82B7}" type="datetimeFigureOut">
               <a:rPr lang="en-US" smtClean="0"/>
-              <a:t>11/20/22</a:t>
+              <a:t>11/25/22</a:t>
             </a:fld>
             <a:endParaRPr lang="en-US"/>
           </a:p>
@@ -452,7 +457,7 @@
           <a:p>
             <a:fld id="{1D016DAE-6BDB-074E-B429-4978463B82B7}" type="datetimeFigureOut">
               <a:rPr lang="en-US" smtClean="0"/>
-              <a:t>11/20/22</a:t>
+              <a:t>11/25/22</a:t>
             </a:fld>
             <a:endParaRPr lang="en-US"/>
           </a:p>
@@ -660,7 +665,7 @@
           <a:p>
             <a:fld id="{1D016DAE-6BDB-074E-B429-4978463B82B7}" type="datetimeFigureOut">
               <a:rPr lang="en-US" smtClean="0"/>
-              <a:t>11/20/22</a:t>
+              <a:t>11/25/22</a:t>
             </a:fld>
             <a:endParaRPr lang="en-US"/>
           </a:p>
@@ -858,7 +863,7 @@
           <a:p>
             <a:fld id="{1D016DAE-6BDB-074E-B429-4978463B82B7}" type="datetimeFigureOut">
               <a:rPr lang="en-US" smtClean="0"/>
-              <a:t>11/20/22</a:t>
+              <a:t>11/25/22</a:t>
             </a:fld>
             <a:endParaRPr lang="en-US"/>
           </a:p>
@@ -1133,7 +1138,7 @@
           <a:p>
             <a:fld id="{1D016DAE-6BDB-074E-B429-4978463B82B7}" type="datetimeFigureOut">
               <a:rPr lang="en-US" smtClean="0"/>
-              <a:t>11/20/22</a:t>
+              <a:t>11/25/22</a:t>
             </a:fld>
             <a:endParaRPr lang="en-US"/>
           </a:p>
@@ -1398,7 +1403,7 @@
           <a:p>
             <a:fld id="{1D016DAE-6BDB-074E-B429-4978463B82B7}" type="datetimeFigureOut">
               <a:rPr lang="en-US" smtClean="0"/>
-              <a:t>11/20/22</a:t>
+              <a:t>11/25/22</a:t>
             </a:fld>
             <a:endParaRPr lang="en-US"/>
           </a:p>
@@ -1810,7 +1815,7 @@
           <a:p>
             <a:fld id="{1D016DAE-6BDB-074E-B429-4978463B82B7}" type="datetimeFigureOut">
               <a:rPr lang="en-US" smtClean="0"/>
-              <a:t>11/20/22</a:t>
+              <a:t>11/25/22</a:t>
             </a:fld>
             <a:endParaRPr lang="en-US"/>
           </a:p>
@@ -1951,7 +1956,7 @@
           <a:p>
             <a:fld id="{1D016DAE-6BDB-074E-B429-4978463B82B7}" type="datetimeFigureOut">
               <a:rPr lang="en-US" smtClean="0"/>
-              <a:t>11/20/22</a:t>
+              <a:t>11/25/22</a:t>
             </a:fld>
             <a:endParaRPr lang="en-US"/>
           </a:p>
@@ -2064,7 +2069,7 @@
           <a:p>
             <a:fld id="{1D016DAE-6BDB-074E-B429-4978463B82B7}" type="datetimeFigureOut">
               <a:rPr lang="en-US" smtClean="0"/>
-              <a:t>11/20/22</a:t>
+              <a:t>11/25/22</a:t>
             </a:fld>
             <a:endParaRPr lang="en-US"/>
           </a:p>
@@ -2375,7 +2380,7 @@
           <a:p>
             <a:fld id="{1D016DAE-6BDB-074E-B429-4978463B82B7}" type="datetimeFigureOut">
               <a:rPr lang="en-US" smtClean="0"/>
-              <a:t>11/20/22</a:t>
+              <a:t>11/25/22</a:t>
             </a:fld>
             <a:endParaRPr lang="en-US"/>
           </a:p>
@@ -2663,7 +2668,7 @@
           <a:p>
             <a:fld id="{1D016DAE-6BDB-074E-B429-4978463B82B7}" type="datetimeFigureOut">
               <a:rPr lang="en-US" smtClean="0"/>
-              <a:t>11/20/22</a:t>
+              <a:t>11/25/22</a:t>
             </a:fld>
             <a:endParaRPr lang="en-US"/>
           </a:p>
@@ -2904,7 +2909,7 @@
           <a:p>
             <a:fld id="{1D016DAE-6BDB-074E-B429-4978463B82B7}" type="datetimeFigureOut">
               <a:rPr lang="en-US" smtClean="0"/>
-              <a:t>11/20/22</a:t>
+              <a:t>11/25/22</a:t>
             </a:fld>
             <a:endParaRPr lang="en-US"/>
           </a:p>
@@ -3323,10 +3328,10 @@
       </p:grpSpPr>
       <p:sp>
         <p:nvSpPr>
-          <p:cNvPr id="4" name="Rectangle 3">
-            <a:extLst>
-              <a:ext uri="{FF2B5EF4-FFF2-40B4-BE49-F238E27FC236}">
-                <a16:creationId xmlns:a16="http://schemas.microsoft.com/office/drawing/2014/main" id="{3E8DD564-5AE7-2385-8123-CF215C3B170A}"/>
+          <p:cNvPr id="3" name="Rectangle 2">
+            <a:extLst>
+              <a:ext uri="{FF2B5EF4-FFF2-40B4-BE49-F238E27FC236}">
+                <a16:creationId xmlns:a16="http://schemas.microsoft.com/office/drawing/2014/main" id="{15C5596A-0C72-7080-ED6A-742C79020FF1}"/>
               </a:ext>
             </a:extLst>
           </p:cNvPr>
@@ -3335,7 +3340,57 @@
         </p:nvSpPr>
         <p:spPr>
           <a:xfrm>
-            <a:off x="2776670" y="5986329"/>
+            <a:off x="3009080" y="5780589"/>
+            <a:ext cx="2020120" cy="538385"/>
+          </a:xfrm>
+          <a:prstGeom prst="rect">
+            <a:avLst/>
+          </a:prstGeom>
+        </p:spPr>
+        <p:style>
+          <a:lnRef idx="2">
+            <a:schemeClr val="accent1">
+              <a:shade val="50000"/>
+            </a:schemeClr>
+          </a:lnRef>
+          <a:fillRef idx="1">
+            <a:schemeClr val="accent1"/>
+          </a:fillRef>
+          <a:effectRef idx="0">
+            <a:schemeClr val="accent1"/>
+          </a:effectRef>
+          <a:fontRef idx="minor">
+            <a:schemeClr val="lt1"/>
+          </a:fontRef>
+        </p:style>
+        <p:txBody>
+          <a:bodyPr rtlCol="0" anchor="ctr"/>
+          <a:lstStyle/>
+          <a:p>
+            <a:pPr algn="ctr"/>
+            <a:r>
+              <a:rPr lang="en-US" dirty="0" err="1"/>
+              <a:t>creatElement.js</a:t>
+            </a:r>
+            <a:endParaRPr lang="en-US" dirty="0"/>
+          </a:p>
+        </p:txBody>
+      </p:sp>
+      <p:sp>
+        <p:nvSpPr>
+          <p:cNvPr id="4" name="Rectangle 3">
+            <a:extLst>
+              <a:ext uri="{FF2B5EF4-FFF2-40B4-BE49-F238E27FC236}">
+                <a16:creationId xmlns:a16="http://schemas.microsoft.com/office/drawing/2014/main" id="{936DA949-5B46-76BB-6C7A-5FD296897B46}"/>
+              </a:ext>
+            </a:extLst>
+          </p:cNvPr>
+          <p:cNvSpPr/>
+          <p:nvPr/>
+        </p:nvSpPr>
+        <p:spPr>
+          <a:xfrm>
+            <a:off x="5211688" y="3541803"/>
             <a:ext cx="1606609" cy="538385"/>
           </a:xfrm>
           <a:prstGeom prst="rect">
@@ -3364,9 +3419,10 @@
           <a:p>
             <a:pPr algn="ctr"/>
             <a:r>
-              <a:rPr lang="en-US" dirty="0"/>
-              <a:t>Book</a:t>
-            </a:r>
+              <a:rPr lang="en-US" dirty="0" err="1"/>
+              <a:t>BookDisplay.js</a:t>
+            </a:r>
+            <a:endParaRPr lang="en-US" dirty="0"/>
           </a:p>
         </p:txBody>
       </p:sp>
@@ -3375,7 +3431,7 @@
           <p:cNvPr id="5" name="Rectangle 4">
             <a:extLst>
               <a:ext uri="{FF2B5EF4-FFF2-40B4-BE49-F238E27FC236}">
-                <a16:creationId xmlns:a16="http://schemas.microsoft.com/office/drawing/2014/main" id="{8A689EF4-00C7-96BD-79D0-849EACBF4EF5}"/>
+                <a16:creationId xmlns:a16="http://schemas.microsoft.com/office/drawing/2014/main" id="{79943AD6-F9E0-D82D-1ADD-7618F22F6127}"/>
               </a:ext>
             </a:extLst>
           </p:cNvPr>
@@ -3384,7 +3440,7 @@
         </p:nvSpPr>
         <p:spPr>
           <a:xfrm>
-            <a:off x="4919532" y="4977033"/>
+            <a:off x="2784329" y="3541804"/>
             <a:ext cx="1606609" cy="538385"/>
           </a:xfrm>
           <a:prstGeom prst="rect">
@@ -3414,8 +3470,13 @@
             <a:pPr algn="ctr"/>
             <a:r>
               <a:rPr lang="en-US" dirty="0"/>
-              <a:t>library</a:t>
-            </a:r>
+              <a:t>Modal-</a:t>
+            </a:r>
+            <a:r>
+              <a:rPr lang="en-US" dirty="0" err="1"/>
+              <a:t>delete.js</a:t>
+            </a:r>
+            <a:endParaRPr lang="en-US" dirty="0"/>
           </a:p>
         </p:txBody>
       </p:sp>
@@ -3424,7 +3485,7 @@
           <p:cNvPr id="6" name="Rectangle 5">
             <a:extLst>
               <a:ext uri="{FF2B5EF4-FFF2-40B4-BE49-F238E27FC236}">
-                <a16:creationId xmlns:a16="http://schemas.microsoft.com/office/drawing/2014/main" id="{8C50A30A-ADAF-86C9-D98A-684AD0ADB8FF}"/>
+                <a16:creationId xmlns:a16="http://schemas.microsoft.com/office/drawing/2014/main" id="{4C95BDB4-8F63-0133-8FB8-21FCBCABFCD7}"/>
               </a:ext>
             </a:extLst>
           </p:cNvPr>
@@ -3433,7 +3494,7 @@
         </p:nvSpPr>
         <p:spPr>
           <a:xfrm>
-            <a:off x="4862556" y="205099"/>
+            <a:off x="8180676" y="5780589"/>
             <a:ext cx="1606609" cy="538385"/>
           </a:xfrm>
           <a:prstGeom prst="rect">
@@ -3462,10 +3523,9 @@
           <a:p>
             <a:pPr algn="ctr"/>
             <a:r>
-              <a:rPr lang="en-US" dirty="0" err="1"/>
-              <a:t>Index.js</a:t>
-            </a:r>
-            <a:endParaRPr lang="en-US" dirty="0"/>
+              <a:rPr lang="en-US" dirty="0"/>
+              <a:t>Book</a:t>
+            </a:r>
           </a:p>
         </p:txBody>
       </p:sp>
@@ -3474,7 +3534,7 @@
           <p:cNvPr id="7" name="Rectangle 6">
             <a:extLst>
               <a:ext uri="{FF2B5EF4-FFF2-40B4-BE49-F238E27FC236}">
-                <a16:creationId xmlns:a16="http://schemas.microsoft.com/office/drawing/2014/main" id="{6782720C-9389-8F79-6CC5-C6E2298E6358}"/>
+                <a16:creationId xmlns:a16="http://schemas.microsoft.com/office/drawing/2014/main" id="{DB19EE49-FF80-64B9-F59C-ADDDEFBA7814}"/>
               </a:ext>
             </a:extLst>
           </p:cNvPr>
@@ -3483,7 +3543,7 @@
         </p:nvSpPr>
         <p:spPr>
           <a:xfrm>
-            <a:off x="1853547" y="1415575"/>
+            <a:off x="5246633" y="246973"/>
             <a:ext cx="1606609" cy="538385"/>
           </a:xfrm>
           <a:prstGeom prst="rect">
@@ -3512,12 +3572,8 @@
           <a:p>
             <a:pPr algn="ctr"/>
             <a:r>
-              <a:rPr lang="en-US" dirty="0"/>
-              <a:t>  </a:t>
-            </a:r>
-            <a:r>
               <a:rPr lang="en-US" dirty="0" err="1"/>
-              <a:t>clickHandler</a:t>
+              <a:t>index.js</a:t>
             </a:r>
             <a:endParaRPr lang="en-US" dirty="0"/>
           </a:p>
@@ -3528,7 +3584,7 @@
           <p:cNvPr id="8" name="Rectangle 7">
             <a:extLst>
               <a:ext uri="{FF2B5EF4-FFF2-40B4-BE49-F238E27FC236}">
-                <a16:creationId xmlns:a16="http://schemas.microsoft.com/office/drawing/2014/main" id="{465D7BEB-D9A2-D3D1-8BFC-E4C97A544B58}"/>
+                <a16:creationId xmlns:a16="http://schemas.microsoft.com/office/drawing/2014/main" id="{70D658D8-07A6-1B0D-2AAB-D225D57BE0AE}"/>
               </a:ext>
             </a:extLst>
           </p:cNvPr>
@@ -3537,7 +3593,57 @@
         </p:nvSpPr>
         <p:spPr>
           <a:xfrm>
-            <a:off x="5665861" y="3533685"/>
+            <a:off x="5180779" y="1605398"/>
+            <a:ext cx="2999897" cy="538385"/>
+          </a:xfrm>
+          <a:prstGeom prst="rect">
+            <a:avLst/>
+          </a:prstGeom>
+        </p:spPr>
+        <p:style>
+          <a:lnRef idx="2">
+            <a:schemeClr val="accent1">
+              <a:shade val="50000"/>
+            </a:schemeClr>
+          </a:lnRef>
+          <a:fillRef idx="1">
+            <a:schemeClr val="accent1"/>
+          </a:fillRef>
+          <a:effectRef idx="0">
+            <a:schemeClr val="accent1"/>
+          </a:effectRef>
+          <a:fontRef idx="minor">
+            <a:schemeClr val="lt1"/>
+          </a:fontRef>
+        </p:style>
+        <p:txBody>
+          <a:bodyPr rtlCol="0" anchor="ctr"/>
+          <a:lstStyle/>
+          <a:p>
+            <a:pPr algn="ctr"/>
+            <a:r>
+              <a:rPr lang="en-US" dirty="0" err="1"/>
+              <a:t>ScreenController.js</a:t>
+            </a:r>
+            <a:endParaRPr lang="en-US" dirty="0"/>
+          </a:p>
+        </p:txBody>
+      </p:sp>
+      <p:sp>
+        <p:nvSpPr>
+          <p:cNvPr id="9" name="Rectangle 8">
+            <a:extLst>
+              <a:ext uri="{FF2B5EF4-FFF2-40B4-BE49-F238E27FC236}">
+                <a16:creationId xmlns:a16="http://schemas.microsoft.com/office/drawing/2014/main" id="{3A108919-FDB0-B2F4-9568-F827EB46C929}"/>
+              </a:ext>
+            </a:extLst>
+          </p:cNvPr>
+          <p:cNvSpPr/>
+          <p:nvPr/>
+        </p:nvSpPr>
+        <p:spPr>
+          <a:xfrm>
+            <a:off x="7527719" y="3541803"/>
             <a:ext cx="1606609" cy="538385"/>
           </a:xfrm>
           <a:prstGeom prst="rect">
@@ -3566,18 +3672,62 @@
           <a:p>
             <a:pPr algn="ctr"/>
             <a:r>
-              <a:rPr lang="en-US" dirty="0"/>
-              <a:t>controller</a:t>
-            </a:r>
-          </a:p>
-        </p:txBody>
-      </p:sp>
-      <p:sp>
-        <p:nvSpPr>
-          <p:cNvPr id="9" name="Rectangle 8">
-            <a:extLst>
-              <a:ext uri="{FF2B5EF4-FFF2-40B4-BE49-F238E27FC236}">
-                <a16:creationId xmlns:a16="http://schemas.microsoft.com/office/drawing/2014/main" id="{F810A751-5EF7-0CA8-2B6E-6A089DF2085C}"/>
+              <a:rPr lang="en-US" dirty="0" err="1"/>
+              <a:t>Library.js</a:t>
+            </a:r>
+            <a:endParaRPr lang="en-US" dirty="0"/>
+          </a:p>
+        </p:txBody>
+      </p:sp>
+      <p:cxnSp>
+        <p:nvCxnSpPr>
+          <p:cNvPr id="10" name="Straight Arrow Connector 9">
+            <a:extLst>
+              <a:ext uri="{FF2B5EF4-FFF2-40B4-BE49-F238E27FC236}">
+                <a16:creationId xmlns:a16="http://schemas.microsoft.com/office/drawing/2014/main" id="{BCFCA056-220F-34BC-A5C1-6BE7E6FDE4C9}"/>
+              </a:ext>
+            </a:extLst>
+          </p:cNvPr>
+          <p:cNvCxnSpPr>
+            <a:cxnSpLocks/>
+            <a:stCxn id="9" idx="0"/>
+            <a:endCxn id="8" idx="2"/>
+          </p:cNvCxnSpPr>
+          <p:nvPr/>
+        </p:nvCxnSpPr>
+        <p:spPr>
+          <a:xfrm flipH="1" flipV="1">
+            <a:off x="6680728" y="2143783"/>
+            <a:ext cx="1650296" cy="1398020"/>
+          </a:xfrm>
+          <a:prstGeom prst="straightConnector1">
+            <a:avLst/>
+          </a:prstGeom>
+          <a:ln>
+            <a:tailEnd type="triangle"/>
+          </a:ln>
+        </p:spPr>
+        <p:style>
+          <a:lnRef idx="1">
+            <a:schemeClr val="accent1"/>
+          </a:lnRef>
+          <a:fillRef idx="0">
+            <a:schemeClr val="accent1"/>
+          </a:fillRef>
+          <a:effectRef idx="0">
+            <a:schemeClr val="accent1"/>
+          </a:effectRef>
+          <a:fontRef idx="minor">
+            <a:schemeClr val="tx1"/>
+          </a:fontRef>
+        </p:style>
+      </p:cxnSp>
+      <p:sp>
+        <p:nvSpPr>
+          <p:cNvPr id="12" name="Rectangle 11">
+            <a:extLst>
+              <a:ext uri="{FF2B5EF4-FFF2-40B4-BE49-F238E27FC236}">
+                <a16:creationId xmlns:a16="http://schemas.microsoft.com/office/drawing/2014/main" id="{0BCE2D68-A28D-86D8-C67F-B1A5F3D88087}"/>
               </a:ext>
             </a:extLst>
           </p:cNvPr>
@@ -3586,7 +3736,7 @@
         </p:nvSpPr>
         <p:spPr>
           <a:xfrm>
-            <a:off x="2776671" y="4035750"/>
+            <a:off x="10060997" y="3541803"/>
             <a:ext cx="1606609" cy="538385"/>
           </a:xfrm>
           <a:prstGeom prst="rect">
@@ -3615,31 +3765,33 @@
           <a:p>
             <a:pPr algn="ctr"/>
             <a:r>
-              <a:rPr lang="en-US" dirty="0"/>
-              <a:t>view</a:t>
-            </a:r>
+              <a:rPr lang="en-US" dirty="0" err="1"/>
+              <a:t>Styles.css</a:t>
+            </a:r>
+            <a:endParaRPr lang="en-US" dirty="0"/>
           </a:p>
         </p:txBody>
       </p:sp>
       <p:cxnSp>
         <p:nvCxnSpPr>
-          <p:cNvPr id="11" name="Straight Arrow Connector 10">
-            <a:extLst>
-              <a:ext uri="{FF2B5EF4-FFF2-40B4-BE49-F238E27FC236}">
-                <a16:creationId xmlns:a16="http://schemas.microsoft.com/office/drawing/2014/main" id="{6B4D35B2-DBCB-E418-EC0B-988C980DC4E4}"/>
+          <p:cNvPr id="13" name="Straight Arrow Connector 12">
+            <a:extLst>
+              <a:ext uri="{FF2B5EF4-FFF2-40B4-BE49-F238E27FC236}">
+                <a16:creationId xmlns:a16="http://schemas.microsoft.com/office/drawing/2014/main" id="{19D3C0C5-F680-AB86-79A2-AEDCE33CDB83}"/>
               </a:ext>
             </a:extLst>
           </p:cNvPr>
           <p:cNvCxnSpPr>
-            <a:stCxn id="4" idx="0"/>
-            <a:endCxn id="5" idx="2"/>
+            <a:cxnSpLocks/>
+            <a:stCxn id="12" idx="0"/>
+            <a:endCxn id="8" idx="2"/>
           </p:cNvCxnSpPr>
           <p:nvPr/>
         </p:nvCxnSpPr>
         <p:spPr>
-          <a:xfrm flipV="1">
-            <a:off x="3579975" y="5515418"/>
-            <a:ext cx="2142862" cy="470911"/>
+          <a:xfrm flipH="1" flipV="1">
+            <a:off x="6680728" y="2143783"/>
+            <a:ext cx="4183574" cy="1398020"/>
           </a:xfrm>
           <a:prstGeom prst="straightConnector1">
             <a:avLst/>
@@ -3665,23 +3817,24 @@
       </p:cxnSp>
       <p:cxnSp>
         <p:nvCxnSpPr>
-          <p:cNvPr id="13" name="Straight Arrow Connector 12">
-            <a:extLst>
-              <a:ext uri="{FF2B5EF4-FFF2-40B4-BE49-F238E27FC236}">
-                <a16:creationId xmlns:a16="http://schemas.microsoft.com/office/drawing/2014/main" id="{ECDBFB80-BF65-03D0-C66F-C50D3CA6A4B2}"/>
+          <p:cNvPr id="19" name="Straight Arrow Connector 18">
+            <a:extLst>
+              <a:ext uri="{FF2B5EF4-FFF2-40B4-BE49-F238E27FC236}">
+                <a16:creationId xmlns:a16="http://schemas.microsoft.com/office/drawing/2014/main" id="{C3CF328E-4D38-A760-E44A-B058FCFA7480}"/>
               </a:ext>
             </a:extLst>
           </p:cNvPr>
           <p:cNvCxnSpPr>
-            <a:stCxn id="4" idx="0"/>
-            <a:endCxn id="6" idx="2"/>
+            <a:cxnSpLocks/>
+            <a:stCxn id="5" idx="0"/>
+            <a:endCxn id="8" idx="2"/>
           </p:cNvCxnSpPr>
           <p:nvPr/>
         </p:nvCxnSpPr>
         <p:spPr>
           <a:xfrm flipV="1">
-            <a:off x="3579975" y="743484"/>
-            <a:ext cx="2085886" cy="5242845"/>
+            <a:off x="3587634" y="2143783"/>
+            <a:ext cx="3093094" cy="1398021"/>
           </a:xfrm>
           <a:prstGeom prst="straightConnector1">
             <a:avLst/>
@@ -3707,24 +3860,24 @@
       </p:cxnSp>
       <p:cxnSp>
         <p:nvCxnSpPr>
-          <p:cNvPr id="14" name="Straight Arrow Connector 13">
-            <a:extLst>
-              <a:ext uri="{FF2B5EF4-FFF2-40B4-BE49-F238E27FC236}">
-                <a16:creationId xmlns:a16="http://schemas.microsoft.com/office/drawing/2014/main" id="{25524177-3D55-1BE2-3BCE-4296A438D74B}"/>
+          <p:cNvPr id="22" name="Straight Arrow Connector 21">
+            <a:extLst>
+              <a:ext uri="{FF2B5EF4-FFF2-40B4-BE49-F238E27FC236}">
+                <a16:creationId xmlns:a16="http://schemas.microsoft.com/office/drawing/2014/main" id="{9BEE982E-11A4-F216-55E2-B1D718D22531}"/>
               </a:ext>
             </a:extLst>
           </p:cNvPr>
           <p:cNvCxnSpPr>
             <a:cxnSpLocks/>
-            <a:stCxn id="8" idx="0"/>
-            <a:endCxn id="6" idx="2"/>
+            <a:stCxn id="4" idx="0"/>
+            <a:endCxn id="8" idx="2"/>
           </p:cNvCxnSpPr>
           <p:nvPr/>
         </p:nvCxnSpPr>
         <p:spPr>
-          <a:xfrm flipH="1" flipV="1">
-            <a:off x="5665861" y="743484"/>
-            <a:ext cx="803305" cy="2790201"/>
+          <a:xfrm flipV="1">
+            <a:off x="6014993" y="2143783"/>
+            <a:ext cx="665735" cy="1398020"/>
           </a:xfrm>
           <a:prstGeom prst="straightConnector1">
             <a:avLst/>
@@ -3750,24 +3903,24 @@
       </p:cxnSp>
       <p:cxnSp>
         <p:nvCxnSpPr>
-          <p:cNvPr id="17" name="Straight Arrow Connector 16">
-            <a:extLst>
-              <a:ext uri="{FF2B5EF4-FFF2-40B4-BE49-F238E27FC236}">
-                <a16:creationId xmlns:a16="http://schemas.microsoft.com/office/drawing/2014/main" id="{D2BBC5AE-ACCA-12D3-9546-E32AB69ADD30}"/>
+          <p:cNvPr id="25" name="Straight Arrow Connector 24">
+            <a:extLst>
+              <a:ext uri="{FF2B5EF4-FFF2-40B4-BE49-F238E27FC236}">
+                <a16:creationId xmlns:a16="http://schemas.microsoft.com/office/drawing/2014/main" id="{08D129D4-1C28-33C6-4D62-276698027430}"/>
               </a:ext>
             </a:extLst>
           </p:cNvPr>
           <p:cNvCxnSpPr>
             <a:cxnSpLocks/>
-            <a:stCxn id="7" idx="0"/>
-            <a:endCxn id="6" idx="2"/>
+            <a:stCxn id="6" idx="0"/>
+            <a:endCxn id="9" idx="2"/>
           </p:cNvCxnSpPr>
           <p:nvPr/>
         </p:nvCxnSpPr>
         <p:spPr>
-          <a:xfrm flipV="1">
-            <a:off x="2656852" y="743484"/>
-            <a:ext cx="3009009" cy="672091"/>
+          <a:xfrm flipH="1" flipV="1">
+            <a:off x="8331024" y="4080188"/>
+            <a:ext cx="652957" cy="1700401"/>
           </a:xfrm>
           <a:prstGeom prst="straightConnector1">
             <a:avLst/>
@@ -3793,24 +3946,24 @@
       </p:cxnSp>
       <p:cxnSp>
         <p:nvCxnSpPr>
-          <p:cNvPr id="20" name="Straight Arrow Connector 19">
-            <a:extLst>
-              <a:ext uri="{FF2B5EF4-FFF2-40B4-BE49-F238E27FC236}">
-                <a16:creationId xmlns:a16="http://schemas.microsoft.com/office/drawing/2014/main" id="{6BEDE83C-C080-6382-A3D6-6C9776CE91C0}"/>
+          <p:cNvPr id="28" name="Straight Arrow Connector 27">
+            <a:extLst>
+              <a:ext uri="{FF2B5EF4-FFF2-40B4-BE49-F238E27FC236}">
+                <a16:creationId xmlns:a16="http://schemas.microsoft.com/office/drawing/2014/main" id="{E7945DA1-E07B-DD85-9CAE-7AE3E1748964}"/>
               </a:ext>
             </a:extLst>
           </p:cNvPr>
           <p:cNvCxnSpPr>
             <a:cxnSpLocks/>
-            <a:stCxn id="9" idx="0"/>
+            <a:stCxn id="8" idx="0"/>
             <a:endCxn id="7" idx="2"/>
           </p:cNvCxnSpPr>
           <p:nvPr/>
         </p:nvCxnSpPr>
         <p:spPr>
           <a:xfrm flipH="1" flipV="1">
-            <a:off x="2656852" y="1953960"/>
-            <a:ext cx="923124" cy="2081790"/>
+            <a:off x="6049938" y="785358"/>
+            <a:ext cx="630790" cy="820040"/>
           </a:xfrm>
           <a:prstGeom prst="straightConnector1">
             <a:avLst/>
@@ -3836,24 +3989,24 @@
       </p:cxnSp>
       <p:cxnSp>
         <p:nvCxnSpPr>
-          <p:cNvPr id="24" name="Straight Arrow Connector 23">
-            <a:extLst>
-              <a:ext uri="{FF2B5EF4-FFF2-40B4-BE49-F238E27FC236}">
-                <a16:creationId xmlns:a16="http://schemas.microsoft.com/office/drawing/2014/main" id="{C63A0AE1-F087-31A7-B821-CF4944BBFC4C}"/>
+          <p:cNvPr id="31" name="Straight Arrow Connector 30">
+            <a:extLst>
+              <a:ext uri="{FF2B5EF4-FFF2-40B4-BE49-F238E27FC236}">
+                <a16:creationId xmlns:a16="http://schemas.microsoft.com/office/drawing/2014/main" id="{BFBB5E5C-8CCF-4A2E-15BE-F0E667E9122A}"/>
               </a:ext>
             </a:extLst>
           </p:cNvPr>
           <p:cNvCxnSpPr>
             <a:cxnSpLocks/>
-            <a:stCxn id="9" idx="0"/>
-            <a:endCxn id="6" idx="2"/>
+            <a:stCxn id="3" idx="0"/>
+            <a:endCxn id="5" idx="2"/>
           </p:cNvCxnSpPr>
           <p:nvPr/>
         </p:nvCxnSpPr>
         <p:spPr>
-          <a:xfrm flipV="1">
-            <a:off x="3579976" y="743484"/>
-            <a:ext cx="2085885" cy="3292266"/>
+          <a:xfrm flipH="1" flipV="1">
+            <a:off x="3587634" y="4080189"/>
+            <a:ext cx="431506" cy="1700400"/>
           </a:xfrm>
           <a:prstGeom prst="straightConnector1">
             <a:avLst/>
@@ -3879,24 +4032,24 @@
       </p:cxnSp>
       <p:cxnSp>
         <p:nvCxnSpPr>
-          <p:cNvPr id="30" name="Straight Arrow Connector 29">
-            <a:extLst>
-              <a:ext uri="{FF2B5EF4-FFF2-40B4-BE49-F238E27FC236}">
-                <a16:creationId xmlns:a16="http://schemas.microsoft.com/office/drawing/2014/main" id="{759621D4-1667-CB5B-06B3-89E122301DC7}"/>
+          <p:cNvPr id="34" name="Straight Arrow Connector 33">
+            <a:extLst>
+              <a:ext uri="{FF2B5EF4-FFF2-40B4-BE49-F238E27FC236}">
+                <a16:creationId xmlns:a16="http://schemas.microsoft.com/office/drawing/2014/main" id="{FF07115D-F638-A411-D2B0-FC2BC2B3E354}"/>
               </a:ext>
             </a:extLst>
           </p:cNvPr>
           <p:cNvCxnSpPr>
             <a:cxnSpLocks/>
-            <a:stCxn id="8" idx="0"/>
-            <a:endCxn id="7" idx="2"/>
+            <a:stCxn id="3" idx="0"/>
+            <a:endCxn id="4" idx="2"/>
           </p:cNvCxnSpPr>
           <p:nvPr/>
         </p:nvCxnSpPr>
         <p:spPr>
-          <a:xfrm flipH="1" flipV="1">
-            <a:off x="2656852" y="1953960"/>
-            <a:ext cx="3812314" cy="1579725"/>
+          <a:xfrm flipV="1">
+            <a:off x="4019140" y="4080188"/>
+            <a:ext cx="1995853" cy="1700401"/>
           </a:xfrm>
           <a:prstGeom prst="straightConnector1">
             <a:avLst/>
@@ -3922,10 +4075,10 @@
       </p:cxnSp>
       <p:sp>
         <p:nvSpPr>
-          <p:cNvPr id="33" name="Rectangle 32">
-            <a:extLst>
-              <a:ext uri="{FF2B5EF4-FFF2-40B4-BE49-F238E27FC236}">
-                <a16:creationId xmlns:a16="http://schemas.microsoft.com/office/drawing/2014/main" id="{9AB5B968-E357-8AD8-9268-4DC114D88100}"/>
+          <p:cNvPr id="14" name="Rectangle 13">
+            <a:extLst>
+              <a:ext uri="{FF2B5EF4-FFF2-40B4-BE49-F238E27FC236}">
+                <a16:creationId xmlns:a16="http://schemas.microsoft.com/office/drawing/2014/main" id="{089EE6B7-DED9-4A92-869B-391E8FA1C4C2}"/>
               </a:ext>
             </a:extLst>
           </p:cNvPr>
@@ -3934,7 +4087,7 @@
         </p:nvSpPr>
         <p:spPr>
           <a:xfrm>
-            <a:off x="451146" y="2626051"/>
+            <a:off x="612629" y="3541804"/>
             <a:ext cx="1606609" cy="538385"/>
           </a:xfrm>
           <a:prstGeom prst="rect">
@@ -3964,31 +4117,36 @@
             <a:pPr algn="ctr"/>
             <a:r>
               <a:rPr lang="en-US" dirty="0"/>
-              <a:t>Modal</a:t>
-            </a:r>
+              <a:t>Modal-book-</a:t>
+            </a:r>
+            <a:r>
+              <a:rPr lang="en-US" dirty="0" err="1"/>
+              <a:t>details.js</a:t>
+            </a:r>
+            <a:endParaRPr lang="en-US" dirty="0"/>
           </a:p>
         </p:txBody>
       </p:sp>
       <p:cxnSp>
         <p:nvCxnSpPr>
-          <p:cNvPr id="34" name="Straight Arrow Connector 33">
-            <a:extLst>
-              <a:ext uri="{FF2B5EF4-FFF2-40B4-BE49-F238E27FC236}">
-                <a16:creationId xmlns:a16="http://schemas.microsoft.com/office/drawing/2014/main" id="{982F3C77-6DA5-B77A-F0BA-49A56AB5948E}"/>
+          <p:cNvPr id="15" name="Straight Arrow Connector 14">
+            <a:extLst>
+              <a:ext uri="{FF2B5EF4-FFF2-40B4-BE49-F238E27FC236}">
+                <a16:creationId xmlns:a16="http://schemas.microsoft.com/office/drawing/2014/main" id="{314C6546-079E-2D9C-2859-01D4B4230238}"/>
               </a:ext>
             </a:extLst>
           </p:cNvPr>
           <p:cNvCxnSpPr>
             <a:cxnSpLocks/>
-            <a:stCxn id="33" idx="0"/>
-            <a:endCxn id="7" idx="2"/>
+            <a:stCxn id="3" idx="0"/>
+            <a:endCxn id="14" idx="2"/>
           </p:cNvCxnSpPr>
           <p:nvPr/>
         </p:nvCxnSpPr>
         <p:spPr>
-          <a:xfrm flipV="1">
-            <a:off x="1254451" y="1953960"/>
-            <a:ext cx="1402401" cy="672091"/>
+          <a:xfrm flipH="1" flipV="1">
+            <a:off x="1415934" y="4080189"/>
+            <a:ext cx="2603206" cy="1700400"/>
           </a:xfrm>
           <a:prstGeom prst="straightConnector1">
             <a:avLst/>
@@ -4014,24 +4172,24 @@
       </p:cxnSp>
       <p:cxnSp>
         <p:nvCxnSpPr>
-          <p:cNvPr id="37" name="Straight Arrow Connector 36">
-            <a:extLst>
-              <a:ext uri="{FF2B5EF4-FFF2-40B4-BE49-F238E27FC236}">
-                <a16:creationId xmlns:a16="http://schemas.microsoft.com/office/drawing/2014/main" id="{DC1BEF7E-D392-197D-B246-42C5267BF06B}"/>
+          <p:cNvPr id="20" name="Straight Arrow Connector 19">
+            <a:extLst>
+              <a:ext uri="{FF2B5EF4-FFF2-40B4-BE49-F238E27FC236}">
+                <a16:creationId xmlns:a16="http://schemas.microsoft.com/office/drawing/2014/main" id="{0BDEFE2A-F678-6761-C38F-0017BE6753CD}"/>
               </a:ext>
             </a:extLst>
           </p:cNvPr>
           <p:cNvCxnSpPr>
             <a:cxnSpLocks/>
-            <a:stCxn id="5" idx="0"/>
+            <a:stCxn id="14" idx="0"/>
             <a:endCxn id="8" idx="2"/>
           </p:cNvCxnSpPr>
           <p:nvPr/>
         </p:nvCxnSpPr>
         <p:spPr>
           <a:xfrm flipV="1">
-            <a:off x="5722837" y="4072070"/>
-            <a:ext cx="746329" cy="904963"/>
+            <a:off x="1415934" y="2143783"/>
+            <a:ext cx="5264794" cy="1398021"/>
           </a:xfrm>
           <a:prstGeom prst="straightConnector1">
             <a:avLst/>
@@ -4055,182 +4213,10 @@
           </a:fontRef>
         </p:style>
       </p:cxnSp>
-      <p:cxnSp>
-        <p:nvCxnSpPr>
-          <p:cNvPr id="49" name="Straight Arrow Connector 48">
-            <a:extLst>
-              <a:ext uri="{FF2B5EF4-FFF2-40B4-BE49-F238E27FC236}">
-                <a16:creationId xmlns:a16="http://schemas.microsoft.com/office/drawing/2014/main" id="{9E854C2C-01D7-0D30-D7DE-E164F2EFB3EF}"/>
-              </a:ext>
-            </a:extLst>
-          </p:cNvPr>
-          <p:cNvCxnSpPr>
-            <a:cxnSpLocks/>
-            <a:stCxn id="4" idx="0"/>
-            <a:endCxn id="33" idx="2"/>
-          </p:cNvCxnSpPr>
-          <p:nvPr/>
-        </p:nvCxnSpPr>
-        <p:spPr>
-          <a:xfrm flipH="1" flipV="1">
-            <a:off x="1254451" y="3164436"/>
-            <a:ext cx="2325524" cy="2821893"/>
-          </a:xfrm>
-          <a:prstGeom prst="straightConnector1">
-            <a:avLst/>
-          </a:prstGeom>
-          <a:ln>
-            <a:tailEnd type="triangle"/>
-          </a:ln>
-        </p:spPr>
-        <p:style>
-          <a:lnRef idx="1">
-            <a:schemeClr val="accent1"/>
-          </a:lnRef>
-          <a:fillRef idx="0">
-            <a:schemeClr val="accent1"/>
-          </a:fillRef>
-          <a:effectRef idx="0">
-            <a:schemeClr val="accent1"/>
-          </a:effectRef>
-          <a:fontRef idx="minor">
-            <a:schemeClr val="tx1"/>
-          </a:fontRef>
-        </p:style>
-      </p:cxnSp>
-      <p:cxnSp>
-        <p:nvCxnSpPr>
-          <p:cNvPr id="52" name="Straight Arrow Connector 51">
-            <a:extLst>
-              <a:ext uri="{FF2B5EF4-FFF2-40B4-BE49-F238E27FC236}">
-                <a16:creationId xmlns:a16="http://schemas.microsoft.com/office/drawing/2014/main" id="{1CE5369B-93DD-D266-709D-030C8F12956A}"/>
-              </a:ext>
-            </a:extLst>
-          </p:cNvPr>
-          <p:cNvCxnSpPr>
-            <a:cxnSpLocks/>
-            <a:stCxn id="9" idx="0"/>
-            <a:endCxn id="33" idx="2"/>
-          </p:cNvCxnSpPr>
-          <p:nvPr/>
-        </p:nvCxnSpPr>
-        <p:spPr>
-          <a:xfrm flipH="1" flipV="1">
-            <a:off x="1254451" y="3164436"/>
-            <a:ext cx="2325525" cy="871314"/>
-          </a:xfrm>
-          <a:prstGeom prst="straightConnector1">
-            <a:avLst/>
-          </a:prstGeom>
-          <a:ln>
-            <a:tailEnd type="triangle"/>
-          </a:ln>
-        </p:spPr>
-        <p:style>
-          <a:lnRef idx="1">
-            <a:schemeClr val="accent1"/>
-          </a:lnRef>
-          <a:fillRef idx="0">
-            <a:schemeClr val="accent1"/>
-          </a:fillRef>
-          <a:effectRef idx="0">
-            <a:schemeClr val="accent1"/>
-          </a:effectRef>
-          <a:fontRef idx="minor">
-            <a:schemeClr val="tx1"/>
-          </a:fontRef>
-        </p:style>
-      </p:cxnSp>
-      <p:cxnSp>
-        <p:nvCxnSpPr>
-          <p:cNvPr id="55" name="Straight Arrow Connector 54">
-            <a:extLst>
-              <a:ext uri="{FF2B5EF4-FFF2-40B4-BE49-F238E27FC236}">
-                <a16:creationId xmlns:a16="http://schemas.microsoft.com/office/drawing/2014/main" id="{4FD4EE93-B423-304A-D897-912BC694BB8B}"/>
-              </a:ext>
-            </a:extLst>
-          </p:cNvPr>
-          <p:cNvCxnSpPr>
-            <a:cxnSpLocks/>
-            <a:stCxn id="8" idx="0"/>
-            <a:endCxn id="33" idx="2"/>
-          </p:cNvCxnSpPr>
-          <p:nvPr/>
-        </p:nvCxnSpPr>
-        <p:spPr>
-          <a:xfrm flipH="1" flipV="1">
-            <a:off x="1254451" y="3164436"/>
-            <a:ext cx="5214715" cy="369249"/>
-          </a:xfrm>
-          <a:prstGeom prst="straightConnector1">
-            <a:avLst/>
-          </a:prstGeom>
-          <a:ln>
-            <a:tailEnd type="triangle"/>
-          </a:ln>
-        </p:spPr>
-        <p:style>
-          <a:lnRef idx="1">
-            <a:schemeClr val="accent1"/>
-          </a:lnRef>
-          <a:fillRef idx="0">
-            <a:schemeClr val="accent1"/>
-          </a:fillRef>
-          <a:effectRef idx="0">
-            <a:schemeClr val="accent1"/>
-          </a:effectRef>
-          <a:fontRef idx="minor">
-            <a:schemeClr val="tx1"/>
-          </a:fontRef>
-        </p:style>
-      </p:cxnSp>
-      <p:cxnSp>
-        <p:nvCxnSpPr>
-          <p:cNvPr id="79" name="Straight Arrow Connector 78">
-            <a:extLst>
-              <a:ext uri="{FF2B5EF4-FFF2-40B4-BE49-F238E27FC236}">
-                <a16:creationId xmlns:a16="http://schemas.microsoft.com/office/drawing/2014/main" id="{730D5E1F-433F-E0FF-9131-669A716B4B9F}"/>
-              </a:ext>
-            </a:extLst>
-          </p:cNvPr>
-          <p:cNvCxnSpPr>
-            <a:cxnSpLocks/>
-            <a:stCxn id="5" idx="0"/>
-            <a:endCxn id="9" idx="2"/>
-          </p:cNvCxnSpPr>
-          <p:nvPr/>
-        </p:nvCxnSpPr>
-        <p:spPr>
-          <a:xfrm flipH="1" flipV="1">
-            <a:off x="3579976" y="4574135"/>
-            <a:ext cx="2142861" cy="402898"/>
-          </a:xfrm>
-          <a:prstGeom prst="straightConnector1">
-            <a:avLst/>
-          </a:prstGeom>
-          <a:ln>
-            <a:tailEnd type="triangle"/>
-          </a:ln>
-        </p:spPr>
-        <p:style>
-          <a:lnRef idx="1">
-            <a:schemeClr val="accent1"/>
-          </a:lnRef>
-          <a:fillRef idx="0">
-            <a:schemeClr val="accent1"/>
-          </a:fillRef>
-          <a:effectRef idx="0">
-            <a:schemeClr val="accent1"/>
-          </a:effectRef>
-          <a:fontRef idx="minor">
-            <a:schemeClr val="tx1"/>
-          </a:fontRef>
-        </p:style>
-      </p:cxnSp>
     </p:spTree>
     <p:extLst>
       <p:ext uri="{BB962C8B-B14F-4D97-AF65-F5344CB8AC3E}">
-        <p14:creationId xmlns:p14="http://schemas.microsoft.com/office/powerpoint/2010/main" val="3386256743"/>
+        <p14:creationId xmlns:p14="http://schemas.microsoft.com/office/powerpoint/2010/main" val="709827002"/>
       </p:ext>
     </p:extLst>
   </p:cSld>

</xml_diff>